<commit_message>
:memo: Adiciona documentação e scripts de limpeza de recursos ociosos em 6 projetos GCP
</commit_message>
<xml_diff>
--- a/infraestrutura_gcp_movva_completa.pptx
+++ b/infraestrutura_gcp_movva_completa.pptx
@@ -9225,8 +9225,48 @@
         <a:lstStyle/>
         <a:p>
           <a:r>
-            <a:rPr lang="en-US"/>
-            <a:t>6 projetos principais: rapidpro, datalake, coltrane, dashboards, splitter, captcha</a:t>
+            <a:rPr lang="en-US" dirty="0"/>
+            <a:t>6 </a:t>
+          </a:r>
+          <a:r>
+            <a:rPr lang="en-US" dirty="0" err="1"/>
+            <a:t>projetos</a:t>
+          </a:r>
+          <a:r>
+            <a:rPr lang="en-US" dirty="0"/>
+            <a:t> </a:t>
+          </a:r>
+          <a:r>
+            <a:rPr lang="en-US" dirty="0" err="1"/>
+            <a:t>principais</a:t>
+          </a:r>
+          <a:r>
+            <a:rPr lang="en-US" dirty="0"/>
+            <a:t>: </a:t>
+          </a:r>
+          <a:r>
+            <a:rPr lang="en-US" dirty="0" err="1"/>
+            <a:t>rapidpro</a:t>
+          </a:r>
+          <a:r>
+            <a:rPr lang="en-US" dirty="0"/>
+            <a:t>, </a:t>
+          </a:r>
+          <a:r>
+            <a:rPr lang="en-US" dirty="0" err="1"/>
+            <a:t>datalake</a:t>
+          </a:r>
+          <a:r>
+            <a:rPr lang="en-US" dirty="0"/>
+            <a:t>, </a:t>
+          </a:r>
+          <a:r>
+            <a:rPr lang="en-US" dirty="0" err="1"/>
+            <a:t>coltrane</a:t>
+          </a:r>
+          <a:r>
+            <a:rPr lang="en-US" dirty="0"/>
+            <a:t>, dashboards, splitter, captcha</a:t>
           </a:r>
         </a:p>
       </dgm:t>
@@ -9297,8 +9337,28 @@
         <a:lstStyle/>
         <a:p>
           <a:r>
-            <a:rPr lang="en-US"/>
-            <a:t>Período de análise: 01 a 30 de abril de 2025</a:t>
+            <a:rPr lang="en-US" dirty="0" err="1"/>
+            <a:t>Período</a:t>
+          </a:r>
+          <a:r>
+            <a:rPr lang="en-US" dirty="0"/>
+            <a:t> de </a:t>
+          </a:r>
+          <a:r>
+            <a:rPr lang="en-US" dirty="0" err="1"/>
+            <a:t>análise</a:t>
+          </a:r>
+          <a:r>
+            <a:rPr lang="en-US" dirty="0"/>
+            <a:t>: 01 a 30 de </a:t>
+          </a:r>
+          <a:r>
+            <a:rPr lang="en-US" dirty="0" err="1"/>
+            <a:t>abril</a:t>
+          </a:r>
+          <a:r>
+            <a:rPr lang="en-US" dirty="0"/>
+            <a:t> de 2025</a:t>
           </a:r>
         </a:p>
       </dgm:t>
@@ -10109,8 +10169,12 @@
         <a:lstStyle/>
         <a:p>
           <a:r>
-            <a:rPr lang="en-US"/>
-            <a:t>Custo Bruto Total: R$ 17.258,90</a:t>
+            <a:rPr lang="en-US" dirty="0" err="1"/>
+            <a:t>Custo</a:t>
+          </a:r>
+          <a:r>
+            <a:rPr lang="en-US" dirty="0"/>
+            <a:t> Bruto Total: R$ 17.258,90</a:t>
           </a:r>
         </a:p>
       </dgm:t>
@@ -10145,8 +10209,20 @@
         <a:lstStyle/>
         <a:p>
           <a:r>
-            <a:rPr lang="en-US"/>
-            <a:t>Créditos Aplicados: R$ 3.508,07</a:t>
+            <a:rPr lang="en-US" dirty="0" err="1"/>
+            <a:t>Créditos</a:t>
+          </a:r>
+          <a:r>
+            <a:rPr lang="en-US" dirty="0"/>
+            <a:t> </a:t>
+          </a:r>
+          <a:r>
+            <a:rPr lang="en-US" dirty="0" err="1"/>
+            <a:t>Aplicados</a:t>
+          </a:r>
+          <a:r>
+            <a:rPr lang="en-US" dirty="0"/>
+            <a:t>: R$ 3.508,07</a:t>
           </a:r>
         </a:p>
       </dgm:t>
@@ -10181,8 +10257,20 @@
         <a:lstStyle/>
         <a:p>
           <a:r>
-            <a:rPr lang="en-US"/>
-            <a:t>Custo Líquido Total: R$ 13.750,83</a:t>
+            <a:rPr lang="en-US" dirty="0" err="1"/>
+            <a:t>Custo</a:t>
+          </a:r>
+          <a:r>
+            <a:rPr lang="en-US" dirty="0"/>
+            <a:t> </a:t>
+          </a:r>
+          <a:r>
+            <a:rPr lang="en-US" dirty="0" err="1"/>
+            <a:t>Líquido</a:t>
+          </a:r>
+          <a:r>
+            <a:rPr lang="en-US" dirty="0"/>
+            <a:t> Total: R$ 13.750,83</a:t>
           </a:r>
         </a:p>
       </dgm:t>
@@ -10217,8 +10305,24 @@
         <a:lstStyle/>
         <a:p>
           <a:r>
-            <a:rPr lang="en-US"/>
-            <a:t>Maior custo: rapidpro (66% do total)</a:t>
+            <a:rPr lang="en-US" dirty="0"/>
+            <a:t>Maior </a:t>
+          </a:r>
+          <a:r>
+            <a:rPr lang="en-US" dirty="0" err="1"/>
+            <a:t>custo</a:t>
+          </a:r>
+          <a:r>
+            <a:rPr lang="en-US" dirty="0"/>
+            <a:t>: </a:t>
+          </a:r>
+          <a:r>
+            <a:rPr lang="en-US" dirty="0" err="1"/>
+            <a:t>rapidpro</a:t>
+          </a:r>
+          <a:r>
+            <a:rPr lang="en-US" dirty="0"/>
+            <a:t> (66% do total)</a:t>
           </a:r>
         </a:p>
       </dgm:t>
@@ -11912,8 +12016,20 @@
             <a:defRPr cap="all"/>
           </a:pPr>
           <a:r>
-            <a:rPr lang="en-US"/>
-            <a:t>Escalonamento automático GKE</a:t>
+            <a:rPr lang="en-US" dirty="0" err="1"/>
+            <a:t>Escalonamento</a:t>
+          </a:r>
+          <a:r>
+            <a:rPr lang="en-US" dirty="0"/>
+            <a:t> </a:t>
+          </a:r>
+          <a:r>
+            <a:rPr lang="en-US" dirty="0" err="1"/>
+            <a:t>automático</a:t>
+          </a:r>
+          <a:r>
+            <a:rPr lang="en-US" dirty="0"/>
+            <a:t> GKE</a:t>
           </a:r>
         </a:p>
         <a:p>
@@ -11921,8 +12037,16 @@
             <a:defRPr cap="all"/>
           </a:pPr>
           <a:r>
-            <a:rPr lang="en-US"/>
-            <a:t>(R$ 400-600/mês)</a:t>
+            <a:rPr lang="en-US" dirty="0"/>
+            <a:t>(R$ 400-600/</a:t>
+          </a:r>
+          <a:r>
+            <a:rPr lang="en-US" dirty="0" err="1"/>
+            <a:t>mês</a:t>
+          </a:r>
+          <a:r>
+            <a:rPr lang="en-US" dirty="0"/>
+            <a:t>)</a:t>
           </a:r>
         </a:p>
       </dgm:t>
@@ -11960,8 +12084,12 @@
             <a:defRPr cap="all"/>
           </a:pPr>
           <a:r>
-            <a:rPr lang="en-US"/>
-            <a:t>Migrar App Engine Flexible</a:t>
+            <a:rPr lang="en-US" dirty="0" err="1"/>
+            <a:t>Migrar</a:t>
+          </a:r>
+          <a:r>
+            <a:rPr lang="en-US" dirty="0"/>
+            <a:t> App Engine Flexible</a:t>
           </a:r>
         </a:p>
         <a:p>
@@ -11969,8 +12097,16 @@
             <a:defRPr cap="all"/>
           </a:pPr>
           <a:r>
-            <a:rPr lang="en-US"/>
-            <a:t>(R$ 300-450/mês)</a:t>
+            <a:rPr lang="en-US" dirty="0"/>
+            <a:t>(R$ 300-450/</a:t>
+          </a:r>
+          <a:r>
+            <a:rPr lang="en-US" dirty="0" err="1"/>
+            <a:t>mês</a:t>
+          </a:r>
+          <a:r>
+            <a:rPr lang="en-US" dirty="0"/>
+            <a:t>)</a:t>
           </a:r>
         </a:p>
       </dgm:t>
@@ -12489,7 +12625,7 @@
       <dgm:spPr/>
     </dgm:pt>
     <dgm:pt modelId="{F183FF92-30D3-4E86-8AAB-2083712B9F98}" type="pres">
-      <dgm:prSet presAssocID="{1C9DC349-41DC-4C49-8C20-A838B3B2D188}" presName="bgRect" presStyleLbl="bgShp" presStyleIdx="0" presStyleCnt="3"/>
+      <dgm:prSet presAssocID="{1C9DC349-41DC-4C49-8C20-A838B3B2D188}" presName="bgRect" presStyleLbl="bgShp" presStyleIdx="0" presStyleCnt="3" custLinFactNeighborX="-7518" custLinFactNeighborY="8515"/>
       <dgm:spPr/>
     </dgm:pt>
     <dgm:pt modelId="{7BA98AD8-F1B2-444C-9FFE-2CF0336B514D}" type="pres">
@@ -12542,7 +12678,7 @@
       <dgm:spPr/>
     </dgm:pt>
     <dgm:pt modelId="{5343FB87-FEF5-4E78-BC5F-0BDE6FD0050B}" type="pres">
-      <dgm:prSet presAssocID="{C3E9A383-4B31-49FB-B838-39101C2D8CB1}" presName="bgRect" presStyleLbl="bgShp" presStyleIdx="1" presStyleCnt="3"/>
+      <dgm:prSet presAssocID="{C3E9A383-4B31-49FB-B838-39101C2D8CB1}" presName="bgRect" presStyleLbl="bgShp" presStyleIdx="1" presStyleCnt="3" custLinFactNeighborX="10903" custLinFactNeighborY="9732"/>
       <dgm:spPr/>
     </dgm:pt>
     <dgm:pt modelId="{ABDF1FA4-4CAD-4097-98B2-559961770BDD}" type="pres">
@@ -13651,8 +13787,48 @@
             <a:buNone/>
           </a:pPr>
           <a:r>
-            <a:rPr lang="en-US" sz="2100" kern="1200"/>
-            <a:t>6 projetos principais: rapidpro, datalake, coltrane, dashboards, splitter, captcha</a:t>
+            <a:rPr lang="en-US" sz="2100" kern="1200" dirty="0"/>
+            <a:t>6 </a:t>
+          </a:r>
+          <a:r>
+            <a:rPr lang="en-US" sz="2100" kern="1200" dirty="0" err="1"/>
+            <a:t>projetos</a:t>
+          </a:r>
+          <a:r>
+            <a:rPr lang="en-US" sz="2100" kern="1200" dirty="0"/>
+            <a:t> </a:t>
+          </a:r>
+          <a:r>
+            <a:rPr lang="en-US" sz="2100" kern="1200" dirty="0" err="1"/>
+            <a:t>principais</a:t>
+          </a:r>
+          <a:r>
+            <a:rPr lang="en-US" sz="2100" kern="1200" dirty="0"/>
+            <a:t>: </a:t>
+          </a:r>
+          <a:r>
+            <a:rPr lang="en-US" sz="2100" kern="1200" dirty="0" err="1"/>
+            <a:t>rapidpro</a:t>
+          </a:r>
+          <a:r>
+            <a:rPr lang="en-US" sz="2100" kern="1200" dirty="0"/>
+            <a:t>, </a:t>
+          </a:r>
+          <a:r>
+            <a:rPr lang="en-US" sz="2100" kern="1200" dirty="0" err="1"/>
+            <a:t>datalake</a:t>
+          </a:r>
+          <a:r>
+            <a:rPr lang="en-US" sz="2100" kern="1200" dirty="0"/>
+            <a:t>, </a:t>
+          </a:r>
+          <a:r>
+            <a:rPr lang="en-US" sz="2100" kern="1200" dirty="0" err="1"/>
+            <a:t>coltrane</a:t>
+          </a:r>
+          <a:r>
+            <a:rPr lang="en-US" sz="2100" kern="1200" dirty="0"/>
+            <a:t>, dashboards, splitter, captcha</a:t>
           </a:r>
         </a:p>
       </dsp:txBody>
@@ -13951,8 +14127,28 @@
             <a:buNone/>
           </a:pPr>
           <a:r>
-            <a:rPr lang="en-US" sz="2100" kern="1200"/>
-            <a:t>Período de análise: 01 a 30 de abril de 2025</a:t>
+            <a:rPr lang="en-US" sz="2100" kern="1200" dirty="0" err="1"/>
+            <a:t>Período</a:t>
+          </a:r>
+          <a:r>
+            <a:rPr lang="en-US" sz="2100" kern="1200" dirty="0"/>
+            <a:t> de </a:t>
+          </a:r>
+          <a:r>
+            <a:rPr lang="en-US" sz="2100" kern="1200" dirty="0" err="1"/>
+            <a:t>análise</a:t>
+          </a:r>
+          <a:r>
+            <a:rPr lang="en-US" sz="2100" kern="1200" dirty="0"/>
+            <a:t>: 01 a 30 de </a:t>
+          </a:r>
+          <a:r>
+            <a:rPr lang="en-US" sz="2100" kern="1200" dirty="0" err="1"/>
+            <a:t>abril</a:t>
+          </a:r>
+          <a:r>
+            <a:rPr lang="en-US" sz="2100" kern="1200" dirty="0"/>
+            <a:t> de 2025</a:t>
           </a:r>
         </a:p>
       </dsp:txBody>
@@ -14912,8 +15108,12 @@
             <a:buNone/>
           </a:pPr>
           <a:r>
-            <a:rPr lang="en-US" sz="2200" kern="1200"/>
-            <a:t>Custo Bruto Total: R$ 17.258,90</a:t>
+            <a:rPr lang="en-US" sz="2200" kern="1200" dirty="0" err="1"/>
+            <a:t>Custo</a:t>
+          </a:r>
+          <a:r>
+            <a:rPr lang="en-US" sz="2200" kern="1200" dirty="0"/>
+            <a:t> Bruto Total: R$ 17.258,90</a:t>
           </a:r>
         </a:p>
       </dsp:txBody>
@@ -15063,8 +15263,20 @@
             <a:buNone/>
           </a:pPr>
           <a:r>
-            <a:rPr lang="en-US" sz="2200" kern="1200"/>
-            <a:t>Créditos Aplicados: R$ 3.508,07</a:t>
+            <a:rPr lang="en-US" sz="2200" kern="1200" dirty="0" err="1"/>
+            <a:t>Créditos</a:t>
+          </a:r>
+          <a:r>
+            <a:rPr lang="en-US" sz="2200" kern="1200" dirty="0"/>
+            <a:t> </a:t>
+          </a:r>
+          <a:r>
+            <a:rPr lang="en-US" sz="2200" kern="1200" dirty="0" err="1"/>
+            <a:t>Aplicados</a:t>
+          </a:r>
+          <a:r>
+            <a:rPr lang="en-US" sz="2200" kern="1200" dirty="0"/>
+            <a:t>: R$ 3.508,07</a:t>
           </a:r>
         </a:p>
       </dsp:txBody>
@@ -15214,8 +15426,20 @@
             <a:buNone/>
           </a:pPr>
           <a:r>
-            <a:rPr lang="en-US" sz="2200" kern="1200"/>
-            <a:t>Custo Líquido Total: R$ 13.750,83</a:t>
+            <a:rPr lang="en-US" sz="2200" kern="1200" dirty="0" err="1"/>
+            <a:t>Custo</a:t>
+          </a:r>
+          <a:r>
+            <a:rPr lang="en-US" sz="2200" kern="1200" dirty="0"/>
+            <a:t> </a:t>
+          </a:r>
+          <a:r>
+            <a:rPr lang="en-US" sz="2200" kern="1200" dirty="0" err="1"/>
+            <a:t>Líquido</a:t>
+          </a:r>
+          <a:r>
+            <a:rPr lang="en-US" sz="2200" kern="1200" dirty="0"/>
+            <a:t> Total: R$ 13.750,83</a:t>
           </a:r>
         </a:p>
       </dsp:txBody>
@@ -15365,8 +15589,24 @@
             <a:buNone/>
           </a:pPr>
           <a:r>
-            <a:rPr lang="en-US" sz="2200" kern="1200"/>
-            <a:t>Maior custo: rapidpro (66% do total)</a:t>
+            <a:rPr lang="en-US" sz="2200" kern="1200" dirty="0"/>
+            <a:t>Maior </a:t>
+          </a:r>
+          <a:r>
+            <a:rPr lang="en-US" sz="2200" kern="1200" dirty="0" err="1"/>
+            <a:t>custo</a:t>
+          </a:r>
+          <a:r>
+            <a:rPr lang="en-US" sz="2200" kern="1200" dirty="0"/>
+            <a:t>: </a:t>
+          </a:r>
+          <a:r>
+            <a:rPr lang="en-US" sz="2200" kern="1200" dirty="0" err="1"/>
+            <a:t>rapidpro</a:t>
+          </a:r>
+          <a:r>
+            <a:rPr lang="en-US" sz="2200" kern="1200" dirty="0"/>
+            <a:t> (66% do total)</a:t>
           </a:r>
         </a:p>
       </dsp:txBody>
@@ -17620,8 +17860,20 @@
             <a:defRPr cap="all"/>
           </a:pPr>
           <a:r>
-            <a:rPr lang="en-US" sz="1500" kern="1200"/>
-            <a:t>Escalonamento automático GKE</a:t>
+            <a:rPr lang="en-US" sz="1500" kern="1200" dirty="0" err="1"/>
+            <a:t>Escalonamento</a:t>
+          </a:r>
+          <a:r>
+            <a:rPr lang="en-US" sz="1500" kern="1200" dirty="0"/>
+            <a:t> </a:t>
+          </a:r>
+          <a:r>
+            <a:rPr lang="en-US" sz="1500" kern="1200" dirty="0" err="1"/>
+            <a:t>automático</a:t>
+          </a:r>
+          <a:r>
+            <a:rPr lang="en-US" sz="1500" kern="1200" dirty="0"/>
+            <a:t> GKE</a:t>
           </a:r>
         </a:p>
         <a:p>
@@ -17639,8 +17891,16 @@
             <a:defRPr cap="all"/>
           </a:pPr>
           <a:r>
-            <a:rPr lang="en-US" sz="1500" kern="1200"/>
-            <a:t>(R$ 400-600/mês)</a:t>
+            <a:rPr lang="en-US" sz="1500" kern="1200" dirty="0"/>
+            <a:t>(R$ 400-600/</a:t>
+          </a:r>
+          <a:r>
+            <a:rPr lang="en-US" sz="1500" kern="1200" dirty="0" err="1"/>
+            <a:t>mês</a:t>
+          </a:r>
+          <a:r>
+            <a:rPr lang="en-US" sz="1500" kern="1200" dirty="0"/>
+            <a:t>)</a:t>
           </a:r>
         </a:p>
       </dsp:txBody>
@@ -17792,8 +18052,12 @@
             <a:defRPr cap="all"/>
           </a:pPr>
           <a:r>
-            <a:rPr lang="en-US" sz="1500" kern="1200"/>
-            <a:t>Migrar App Engine Flexible</a:t>
+            <a:rPr lang="en-US" sz="1500" kern="1200" dirty="0" err="1"/>
+            <a:t>Migrar</a:t>
+          </a:r>
+          <a:r>
+            <a:rPr lang="en-US" sz="1500" kern="1200" dirty="0"/>
+            <a:t> App Engine Flexible</a:t>
           </a:r>
         </a:p>
         <a:p>
@@ -17811,8 +18075,16 @@
             <a:defRPr cap="all"/>
           </a:pPr>
           <a:r>
-            <a:rPr lang="en-US" sz="1500" kern="1200"/>
-            <a:t>(R$ 300-450/mês)</a:t>
+            <a:rPr lang="en-US" sz="1500" kern="1200" dirty="0"/>
+            <a:t>(R$ 300-450/</a:t>
+          </a:r>
+          <a:r>
+            <a:rPr lang="en-US" sz="1500" kern="1200" dirty="0" err="1"/>
+            <a:t>mês</a:t>
+          </a:r>
+          <a:r>
+            <a:rPr lang="en-US" sz="1500" kern="1200" dirty="0"/>
+            <a:t>)</a:t>
           </a:r>
         </a:p>
       </dsp:txBody>
@@ -17840,7 +18112,7 @@
       </dsp:nvSpPr>
       <dsp:spPr>
         <a:xfrm>
-          <a:off x="0" y="3253"/>
+          <a:off x="0" y="125169"/>
           <a:ext cx="5328412" cy="1431783"/>
         </a:xfrm>
         <a:prstGeom prst="roundRect">
@@ -18037,7 +18309,7 @@
       </dsp:nvSpPr>
       <dsp:spPr>
         <a:xfrm>
-          <a:off x="0" y="1904840"/>
+          <a:off x="0" y="2044182"/>
           <a:ext cx="5328412" cy="1431783"/>
         </a:xfrm>
         <a:prstGeom prst="roundRect">
@@ -32684,7 +32956,7 @@
           <a:p>
             <a:fld id="{5BCAD085-E8A6-8845-BD4E-CB4CCA059FC4}" type="datetimeFigureOut">
               <a:rPr lang="en-US" smtClean="0"/>
-              <a:t>5/12/25</a:t>
+              <a:t>5/14/25</a:t>
             </a:fld>
             <a:endParaRPr lang="en-US"/>
           </a:p>
@@ -32854,7 +33126,7 @@
           <a:p>
             <a:fld id="{5BCAD085-E8A6-8845-BD4E-CB4CCA059FC4}" type="datetimeFigureOut">
               <a:rPr lang="en-US" smtClean="0"/>
-              <a:t>5/12/25</a:t>
+              <a:t>5/14/25</a:t>
             </a:fld>
             <a:endParaRPr lang="en-US"/>
           </a:p>
@@ -33034,7 +33306,7 @@
           <a:p>
             <a:fld id="{5BCAD085-E8A6-8845-BD4E-CB4CCA059FC4}" type="datetimeFigureOut">
               <a:rPr lang="en-US" smtClean="0"/>
-              <a:t>5/12/25</a:t>
+              <a:t>5/14/25</a:t>
             </a:fld>
             <a:endParaRPr lang="en-US"/>
           </a:p>
@@ -33204,7 +33476,7 @@
           <a:p>
             <a:fld id="{5BCAD085-E8A6-8845-BD4E-CB4CCA059FC4}" type="datetimeFigureOut">
               <a:rPr lang="en-US" smtClean="0"/>
-              <a:t>5/12/25</a:t>
+              <a:t>5/14/25</a:t>
             </a:fld>
             <a:endParaRPr lang="en-US"/>
           </a:p>
@@ -33462,7 +33734,7 @@
           <a:p>
             <a:fld id="{5BCAD085-E8A6-8845-BD4E-CB4CCA059FC4}" type="datetimeFigureOut">
               <a:rPr lang="en-US" smtClean="0"/>
-              <a:t>5/12/25</a:t>
+              <a:t>5/14/25</a:t>
             </a:fld>
             <a:endParaRPr lang="en-US"/>
           </a:p>
@@ -33750,7 +34022,7 @@
           <a:p>
             <a:fld id="{5BCAD085-E8A6-8845-BD4E-CB4CCA059FC4}" type="datetimeFigureOut">
               <a:rPr lang="en-US" smtClean="0"/>
-              <a:t>5/12/25</a:t>
+              <a:t>5/14/25</a:t>
             </a:fld>
             <a:endParaRPr lang="en-US"/>
           </a:p>
@@ -34192,7 +34464,7 @@
           <a:p>
             <a:fld id="{5BCAD085-E8A6-8845-BD4E-CB4CCA059FC4}" type="datetimeFigureOut">
               <a:rPr lang="en-US" smtClean="0"/>
-              <a:t>5/12/25</a:t>
+              <a:t>5/14/25</a:t>
             </a:fld>
             <a:endParaRPr lang="en-US"/>
           </a:p>
@@ -34310,7 +34582,7 @@
           <a:p>
             <a:fld id="{5BCAD085-E8A6-8845-BD4E-CB4CCA059FC4}" type="datetimeFigureOut">
               <a:rPr lang="en-US" smtClean="0"/>
-              <a:t>5/12/25</a:t>
+              <a:t>5/14/25</a:t>
             </a:fld>
             <a:endParaRPr lang="en-US"/>
           </a:p>
@@ -34405,7 +34677,7 @@
           <a:p>
             <a:fld id="{5BCAD085-E8A6-8845-BD4E-CB4CCA059FC4}" type="datetimeFigureOut">
               <a:rPr lang="en-US" smtClean="0"/>
-              <a:t>5/12/25</a:t>
+              <a:t>5/14/25</a:t>
             </a:fld>
             <a:endParaRPr lang="en-US"/>
           </a:p>
@@ -34696,7 +34968,7 @@
           <a:p>
             <a:fld id="{5BCAD085-E8A6-8845-BD4E-CB4CCA059FC4}" type="datetimeFigureOut">
               <a:rPr lang="en-US" smtClean="0"/>
-              <a:t>5/12/25</a:t>
+              <a:t>5/14/25</a:t>
             </a:fld>
             <a:endParaRPr lang="en-US"/>
           </a:p>
@@ -34972,7 +35244,7 @@
           <a:p>
             <a:fld id="{5BCAD085-E8A6-8845-BD4E-CB4CCA059FC4}" type="datetimeFigureOut">
               <a:rPr lang="en-US" smtClean="0"/>
-              <a:t>5/12/25</a:t>
+              <a:t>5/14/25</a:t>
             </a:fld>
             <a:endParaRPr lang="en-US"/>
           </a:p>
@@ -35269,7 +35541,7 @@
           <a:p>
             <a:fld id="{5BCAD085-E8A6-8845-BD4E-CB4CCA059FC4}" type="datetimeFigureOut">
               <a:rPr lang="en-US" smtClean="0"/>
-              <a:t>5/12/25</a:t>
+              <a:t>5/14/25</a:t>
             </a:fld>
             <a:endParaRPr lang="en-US"/>
           </a:p>
@@ -37709,7 +37981,7 @@
             <p:ph idx="1"/>
             <p:extLst>
               <p:ext uri="{D42A27DB-BD31-4B8C-83A1-F6EECF244321}">
-                <p14:modId xmlns:p14="http://schemas.microsoft.com/office/powerpoint/2010/main" val="2917861086"/>
+                <p14:modId xmlns:p14="http://schemas.microsoft.com/office/powerpoint/2010/main" val="1089888553"/>
               </p:ext>
             </p:extLst>
           </p:nvPr>

</xml_diff>